<commit_message>
Push to github: plist
</commit_message>
<xml_diff>
--- a/Tap1-Tan_tinh_ng2.pptx
+++ b/Tap1-Tan_tinh_ng2.pptx
@@ -5,7 +5,7 @@
     <p:sldMasterId id="2147483648" r:id="rId1"/>
   </p:sldMasterIdLst>
   <p:notesMasterIdLst>
-    <p:notesMasterId r:id="rId10"/>
+    <p:notesMasterId r:id="rId11"/>
   </p:notesMasterIdLst>
   <p:sldIdLst>
     <p:sldId id="256" r:id="rId2"/>
@@ -13,9 +13,10 @@
     <p:sldId id="262" r:id="rId4"/>
     <p:sldId id="263" r:id="rId5"/>
     <p:sldId id="260" r:id="rId6"/>
-    <p:sldId id="261" r:id="rId7"/>
-    <p:sldId id="259" r:id="rId8"/>
-    <p:sldId id="258" r:id="rId9"/>
+    <p:sldId id="264" r:id="rId7"/>
+    <p:sldId id="261" r:id="rId8"/>
+    <p:sldId id="259" r:id="rId9"/>
+    <p:sldId id="258" r:id="rId10"/>
   </p:sldIdLst>
   <p:sldSz cx="12192000" cy="6858000"/>
   <p:notesSz cx="6858000" cy="9144000"/>
@@ -204,7 +205,7 @@
           <a:p>
             <a:fld id="{A5FE6C29-653E-3C46-AB41-5A330A43A1D9}" type="datetimeFigureOut">
               <a:rPr lang="en-US" smtClean="0"/>
-              <a:t>11/21/16</a:t>
+              <a:t>11/23/16</a:t>
             </a:fld>
             <a:endParaRPr lang="en-US"/>
           </a:p>
@@ -975,7 +976,7 @@
             <a:fld id="{B61BEF0D-F0BB-DE4B-95CE-6DB70DBA9567}" type="datetimeFigureOut">
               <a:rPr lang="en-US" dirty="0"/>
               <a:pPr/>
-              <a:t>11/21/16</a:t>
+              <a:t>11/23/16</a:t>
             </a:fld>
             <a:endParaRPr lang="en-US" dirty="0"/>
           </a:p>
@@ -1268,7 +1269,7 @@
             <a:fld id="{B61BEF0D-F0BB-DE4B-95CE-6DB70DBA9567}" type="datetimeFigureOut">
               <a:rPr lang="en-US" dirty="0"/>
               <a:pPr/>
-              <a:t>11/21/16</a:t>
+              <a:t>11/23/16</a:t>
             </a:fld>
             <a:endParaRPr lang="en-US" dirty="0"/>
           </a:p>
@@ -1513,7 +1514,7 @@
             <a:fld id="{B61BEF0D-F0BB-DE4B-95CE-6DB70DBA9567}" type="datetimeFigureOut">
               <a:rPr lang="en-US" dirty="0"/>
               <a:pPr/>
-              <a:t>11/21/16</a:t>
+              <a:t>11/23/16</a:t>
             </a:fld>
             <a:endParaRPr lang="en-US" dirty="0"/>
           </a:p>
@@ -2050,7 +2051,7 @@
             <a:fld id="{B61BEF0D-F0BB-DE4B-95CE-6DB70DBA9567}" type="datetimeFigureOut">
               <a:rPr lang="en-US" dirty="0"/>
               <a:pPr/>
-              <a:t>11/21/16</a:t>
+              <a:t>11/23/16</a:t>
             </a:fld>
             <a:endParaRPr lang="en-US" dirty="0"/>
           </a:p>
@@ -2295,7 +2296,7 @@
             <a:fld id="{B61BEF0D-F0BB-DE4B-95CE-6DB70DBA9567}" type="datetimeFigureOut">
               <a:rPr lang="en-US" dirty="0"/>
               <a:pPr/>
-              <a:t>11/21/16</a:t>
+              <a:t>11/23/16</a:t>
             </a:fld>
             <a:endParaRPr lang="en-US" dirty="0"/>
           </a:p>
@@ -2824,7 +2825,7 @@
             <a:fld id="{B61BEF0D-F0BB-DE4B-95CE-6DB70DBA9567}" type="datetimeFigureOut">
               <a:rPr lang="en-US" dirty="0"/>
               <a:pPr/>
-              <a:t>11/21/16</a:t>
+              <a:t>11/23/16</a:t>
             </a:fld>
             <a:endParaRPr lang="en-US" dirty="0"/>
           </a:p>
@@ -3118,7 +3119,7 @@
             <a:fld id="{B61BEF0D-F0BB-DE4B-95CE-6DB70DBA9567}" type="datetimeFigureOut">
               <a:rPr lang="en-US" dirty="0"/>
               <a:pPr/>
-              <a:t>11/21/16</a:t>
+              <a:t>11/23/16</a:t>
             </a:fld>
             <a:endParaRPr lang="en-US" dirty="0"/>
           </a:p>
@@ -3289,7 +3290,7 @@
             <a:fld id="{B61BEF0D-F0BB-DE4B-95CE-6DB70DBA9567}" type="datetimeFigureOut">
               <a:rPr lang="en-US" dirty="0"/>
               <a:pPr/>
-              <a:t>11/21/16</a:t>
+              <a:t>11/23/16</a:t>
             </a:fld>
             <a:endParaRPr lang="en-US" dirty="0"/>
           </a:p>
@@ -3466,7 +3467,7 @@
             <a:fld id="{B61BEF0D-F0BB-DE4B-95CE-6DB70DBA9567}" type="datetimeFigureOut">
               <a:rPr lang="en-US" dirty="0"/>
               <a:pPr/>
-              <a:t>11/21/16</a:t>
+              <a:t>11/23/16</a:t>
             </a:fld>
             <a:endParaRPr lang="en-US" dirty="0"/>
           </a:p>
@@ -3633,7 +3634,7 @@
             <a:fld id="{B61BEF0D-F0BB-DE4B-95CE-6DB70DBA9567}" type="datetimeFigureOut">
               <a:rPr lang="en-US" dirty="0"/>
               <a:pPr/>
-              <a:t>11/21/16</a:t>
+              <a:t>11/23/16</a:t>
             </a:fld>
             <a:endParaRPr lang="en-US" dirty="0"/>
           </a:p>
@@ -3881,7 +3882,7 @@
             <a:fld id="{B61BEF0D-F0BB-DE4B-95CE-6DB70DBA9567}" type="datetimeFigureOut">
               <a:rPr lang="en-US" dirty="0"/>
               <a:pPr/>
-              <a:t>11/21/16</a:t>
+              <a:t>11/23/16</a:t>
             </a:fld>
             <a:endParaRPr lang="en-US" dirty="0"/>
           </a:p>
@@ -4175,7 +4176,7 @@
             <a:fld id="{B61BEF0D-F0BB-DE4B-95CE-6DB70DBA9567}" type="datetimeFigureOut">
               <a:rPr lang="en-US" dirty="0"/>
               <a:pPr/>
-              <a:t>11/21/16</a:t>
+              <a:t>11/23/16</a:t>
             </a:fld>
             <a:endParaRPr lang="en-US" dirty="0"/>
           </a:p>
@@ -4614,7 +4615,7 @@
             <a:fld id="{B61BEF0D-F0BB-DE4B-95CE-6DB70DBA9567}" type="datetimeFigureOut">
               <a:rPr lang="en-US" dirty="0"/>
               <a:pPr/>
-              <a:t>11/21/16</a:t>
+              <a:t>11/23/16</a:t>
             </a:fld>
             <a:endParaRPr lang="en-US" dirty="0"/>
           </a:p>
@@ -4729,7 +4730,7 @@
             <a:fld id="{B61BEF0D-F0BB-DE4B-95CE-6DB70DBA9567}" type="datetimeFigureOut">
               <a:rPr lang="en-US" dirty="0"/>
               <a:pPr/>
-              <a:t>11/21/16</a:t>
+              <a:t>11/23/16</a:t>
             </a:fld>
             <a:endParaRPr lang="en-US" dirty="0"/>
           </a:p>
@@ -4821,7 +4822,7 @@
             <a:fld id="{B61BEF0D-F0BB-DE4B-95CE-6DB70DBA9567}" type="datetimeFigureOut">
               <a:rPr lang="en-US" dirty="0"/>
               <a:pPr/>
-              <a:t>11/21/16</a:t>
+              <a:t>11/23/16</a:t>
             </a:fld>
             <a:endParaRPr lang="en-US" dirty="0"/>
           </a:p>
@@ -5101,7 +5102,7 @@
             <a:fld id="{B61BEF0D-F0BB-DE4B-95CE-6DB70DBA9567}" type="datetimeFigureOut">
               <a:rPr lang="en-US" dirty="0"/>
               <a:pPr/>
-              <a:t>11/21/16</a:t>
+              <a:t>11/23/16</a:t>
             </a:fld>
             <a:endParaRPr lang="en-US" dirty="0"/>
           </a:p>
@@ -5389,7 +5390,7 @@
             <a:fld id="{B61BEF0D-F0BB-DE4B-95CE-6DB70DBA9567}" type="datetimeFigureOut">
               <a:rPr lang="en-US" dirty="0"/>
               <a:pPr/>
-              <a:t>11/21/16</a:t>
+              <a:t>11/23/16</a:t>
             </a:fld>
             <a:endParaRPr lang="en-US" dirty="0"/>
           </a:p>
@@ -5916,7 +5917,7 @@
             <a:fld id="{B61BEF0D-F0BB-DE4B-95CE-6DB70DBA9567}" type="datetimeFigureOut">
               <a:rPr lang="en-US" dirty="0"/>
               <a:pPr/>
-              <a:t>11/21/16</a:t>
+              <a:t>11/23/16</a:t>
             </a:fld>
             <a:endParaRPr lang="en-US" dirty="0"/>
           </a:p>
@@ -8070,6 +8071,71 @@
             <p:ph type="title"/>
           </p:nvPr>
         </p:nvSpPr>
+        <p:spPr/>
+        <p:txBody>
+          <a:bodyPr/>
+          <a:lstStyle/>
+          <a:p>
+            <a:pPr algn="l"/>
+            <a:r>
+              <a:rPr lang="en-US" dirty="0" smtClean="0"/>
+              <a:t>for product of products (for index in products)</a:t>
+            </a:r>
+            <a:br>
+              <a:rPr lang="en-US" dirty="0" smtClean="0"/>
+            </a:br>
+            <a:r>
+              <a:rPr lang="en-US" dirty="0" smtClean="0"/>
+              <a:t>pipeline? </a:t>
+            </a:r>
+            <a:r>
+              <a:rPr lang="en-US" smtClean="0"/>
+              <a:t>Avoid state change.</a:t>
+            </a:r>
+            <a:endParaRPr lang="en-US" dirty="0"/>
+          </a:p>
+        </p:txBody>
+      </p:sp>
+    </p:spTree>
+    <p:extLst>
+      <p:ext uri="{BB962C8B-B14F-4D97-AF65-F5344CB8AC3E}">
+        <p14:creationId xmlns:p14="http://schemas.microsoft.com/office/powerpoint/2010/main" val="531360375"/>
+      </p:ext>
+    </p:extLst>
+  </p:cSld>
+  <p:clrMapOvr>
+    <a:masterClrMapping/>
+  </p:clrMapOvr>
+</p:sld>
+</file>
+
+<file path=ppt/slides/slide7.xml><?xml version="1.0" encoding="utf-8"?>
+<p:sld xmlns:a="http://schemas.openxmlformats.org/drawingml/2006/main" xmlns:r="http://schemas.openxmlformats.org/officeDocument/2006/relationships" xmlns:p="http://schemas.openxmlformats.org/presentationml/2006/main">
+  <p:cSld>
+    <p:spTree>
+      <p:nvGrpSpPr>
+        <p:cNvPr id="1" name=""/>
+        <p:cNvGrpSpPr/>
+        <p:nvPr/>
+      </p:nvGrpSpPr>
+      <p:grpSpPr>
+        <a:xfrm>
+          <a:off x="0" y="0"/>
+          <a:ext cx="0" cy="0"/>
+          <a:chOff x="0" y="0"/>
+          <a:chExt cx="0" cy="0"/>
+        </a:xfrm>
+      </p:grpSpPr>
+      <p:sp>
+        <p:nvSpPr>
+          <p:cNvPr id="2" name="Title 1"/>
+          <p:cNvSpPr>
+            <a:spLocks noGrp="1"/>
+          </p:cNvSpPr>
+          <p:nvPr>
+            <p:ph type="title"/>
+          </p:nvPr>
+        </p:nvSpPr>
         <p:spPr>
           <a:xfrm>
             <a:off x="1531812" y="222662"/>
@@ -8806,7 +8872,7 @@
 </p:sld>
 </file>
 
-<file path=ppt/slides/slide7.xml><?xml version="1.0" encoding="utf-8"?>
+<file path=ppt/slides/slide8.xml><?xml version="1.0" encoding="utf-8"?>
 <p:sld xmlns:a="http://schemas.openxmlformats.org/drawingml/2006/main" xmlns:r="http://schemas.openxmlformats.org/officeDocument/2006/relationships" xmlns:p="http://schemas.openxmlformats.org/presentationml/2006/main">
   <p:cSld>
     <p:spTree>
@@ -9479,7 +9545,7 @@
 </p:sld>
 </file>
 
-<file path=ppt/slides/slide8.xml><?xml version="1.0" encoding="utf-8"?>
+<file path=ppt/slides/slide9.xml><?xml version="1.0" encoding="utf-8"?>
 <p:sld xmlns:a="http://schemas.openxmlformats.org/drawingml/2006/main" xmlns:r="http://schemas.openxmlformats.org/officeDocument/2006/relationships" xmlns:p="http://schemas.openxmlformats.org/presentationml/2006/main">
   <p:cSld>
     <p:spTree>

</xml_diff>